<commit_message>
Added home page with multiples overview
</commit_message>
<xml_diff>
--- a/Project Info.pptx
+++ b/Project Info.pptx
@@ -6,6 +6,8 @@
   </p:sldMasterIdLst>
   <p:sldIdLst>
     <p:sldId id="257" r:id="rId2"/>
+    <p:sldId id="258" r:id="rId3"/>
+    <p:sldId id="259" r:id="rId4"/>
   </p:sldIdLst>
   <p:sldSz cx="12192000" cy="6858000"/>
   <p:notesSz cx="6858000" cy="9144000"/>
@@ -104,6 +106,11 @@
       </a:defRPr>
     </a:lvl9pPr>
   </p:defaultTextStyle>
+  <p:extLst>
+    <p:ext uri="{EFAFB233-063F-42B5-8137-9DF3F51BA10A}">
+      <p15:sldGuideLst xmlns:p15="http://schemas.microsoft.com/office/powerpoint/2012/main"/>
+    </p:ext>
+  </p:extLst>
 </p:presentation>
 </file>
 
@@ -254,7 +261,7 @@
           <a:p>
             <a:fld id="{55FAA0F3-AE7A-426A-BD92-993D3B480020}" type="datetimeFigureOut">
               <a:rPr lang="en-US" smtClean="0"/>
-              <a:t>5/26/2024</a:t>
+              <a:t>6/17/2024</a:t>
             </a:fld>
             <a:endParaRPr lang="en-US"/>
           </a:p>
@@ -452,7 +459,7 @@
           <a:p>
             <a:fld id="{55FAA0F3-AE7A-426A-BD92-993D3B480020}" type="datetimeFigureOut">
               <a:rPr lang="en-US" smtClean="0"/>
-              <a:t>5/26/2024</a:t>
+              <a:t>6/17/2024</a:t>
             </a:fld>
             <a:endParaRPr lang="en-US"/>
           </a:p>
@@ -660,7 +667,7 @@
           <a:p>
             <a:fld id="{55FAA0F3-AE7A-426A-BD92-993D3B480020}" type="datetimeFigureOut">
               <a:rPr lang="en-US" smtClean="0"/>
-              <a:t>5/26/2024</a:t>
+              <a:t>6/17/2024</a:t>
             </a:fld>
             <a:endParaRPr lang="en-US"/>
           </a:p>
@@ -858,7 +865,7 @@
           <a:p>
             <a:fld id="{55FAA0F3-AE7A-426A-BD92-993D3B480020}" type="datetimeFigureOut">
               <a:rPr lang="en-US" smtClean="0"/>
-              <a:t>5/26/2024</a:t>
+              <a:t>6/17/2024</a:t>
             </a:fld>
             <a:endParaRPr lang="en-US"/>
           </a:p>
@@ -1133,7 +1140,7 @@
           <a:p>
             <a:fld id="{55FAA0F3-AE7A-426A-BD92-993D3B480020}" type="datetimeFigureOut">
               <a:rPr lang="en-US" smtClean="0"/>
-              <a:t>5/26/2024</a:t>
+              <a:t>6/17/2024</a:t>
             </a:fld>
             <a:endParaRPr lang="en-US"/>
           </a:p>
@@ -1398,7 +1405,7 @@
           <a:p>
             <a:fld id="{55FAA0F3-AE7A-426A-BD92-993D3B480020}" type="datetimeFigureOut">
               <a:rPr lang="en-US" smtClean="0"/>
-              <a:t>5/26/2024</a:t>
+              <a:t>6/17/2024</a:t>
             </a:fld>
             <a:endParaRPr lang="en-US"/>
           </a:p>
@@ -1810,7 +1817,7 @@
           <a:p>
             <a:fld id="{55FAA0F3-AE7A-426A-BD92-993D3B480020}" type="datetimeFigureOut">
               <a:rPr lang="en-US" smtClean="0"/>
-              <a:t>5/26/2024</a:t>
+              <a:t>6/17/2024</a:t>
             </a:fld>
             <a:endParaRPr lang="en-US"/>
           </a:p>
@@ -1951,7 +1958,7 @@
           <a:p>
             <a:fld id="{55FAA0F3-AE7A-426A-BD92-993D3B480020}" type="datetimeFigureOut">
               <a:rPr lang="en-US" smtClean="0"/>
-              <a:t>5/26/2024</a:t>
+              <a:t>6/17/2024</a:t>
             </a:fld>
             <a:endParaRPr lang="en-US"/>
           </a:p>
@@ -2064,7 +2071,7 @@
           <a:p>
             <a:fld id="{55FAA0F3-AE7A-426A-BD92-993D3B480020}" type="datetimeFigureOut">
               <a:rPr lang="en-US" smtClean="0"/>
-              <a:t>5/26/2024</a:t>
+              <a:t>6/17/2024</a:t>
             </a:fld>
             <a:endParaRPr lang="en-US"/>
           </a:p>
@@ -2375,7 +2382,7 @@
           <a:p>
             <a:fld id="{55FAA0F3-AE7A-426A-BD92-993D3B480020}" type="datetimeFigureOut">
               <a:rPr lang="en-US" smtClean="0"/>
-              <a:t>5/26/2024</a:t>
+              <a:t>6/17/2024</a:t>
             </a:fld>
             <a:endParaRPr lang="en-US"/>
           </a:p>
@@ -2663,7 +2670,7 @@
           <a:p>
             <a:fld id="{55FAA0F3-AE7A-426A-BD92-993D3B480020}" type="datetimeFigureOut">
               <a:rPr lang="en-US" smtClean="0"/>
-              <a:t>5/26/2024</a:t>
+              <a:t>6/17/2024</a:t>
             </a:fld>
             <a:endParaRPr lang="en-US"/>
           </a:p>
@@ -2904,7 +2911,7 @@
           <a:p>
             <a:fld id="{55FAA0F3-AE7A-426A-BD92-993D3B480020}" type="datetimeFigureOut">
               <a:rPr lang="en-US" smtClean="0"/>
-              <a:t>5/26/2024</a:t>
+              <a:t>6/17/2024</a:t>
             </a:fld>
             <a:endParaRPr lang="en-US"/>
           </a:p>
@@ -3490,6 +3497,681 @@
 </p:sld>
 </file>
 
+<file path=ppt/slides/slide2.xml><?xml version="1.0" encoding="utf-8"?>
+<p:sld xmlns:a="http://schemas.openxmlformats.org/drawingml/2006/main" xmlns:r="http://schemas.openxmlformats.org/officeDocument/2006/relationships" xmlns:p="http://schemas.openxmlformats.org/presentationml/2006/main">
+  <p:cSld>
+    <p:spTree>
+      <p:nvGrpSpPr>
+        <p:cNvPr id="1" name=""/>
+        <p:cNvGrpSpPr/>
+        <p:nvPr/>
+      </p:nvGrpSpPr>
+      <p:grpSpPr>
+        <a:xfrm>
+          <a:off x="0" y="0"/>
+          <a:ext cx="0" cy="0"/>
+          <a:chOff x="0" y="0"/>
+          <a:chExt cx="0" cy="0"/>
+        </a:xfrm>
+      </p:grpSpPr>
+      <p:sp>
+        <p:nvSpPr>
+          <p:cNvPr id="2" name="TextBox 1">
+            <a:extLst>
+              <a:ext uri="{FF2B5EF4-FFF2-40B4-BE49-F238E27FC236}">
+                <a16:creationId xmlns:a16="http://schemas.microsoft.com/office/drawing/2014/main" id="{4939BD79-6843-AC34-3D89-3CF2DE5AB475}"/>
+              </a:ext>
+            </a:extLst>
+          </p:cNvPr>
+          <p:cNvSpPr txBox="1"/>
+          <p:nvPr/>
+        </p:nvSpPr>
+        <p:spPr>
+          <a:xfrm>
+            <a:off x="621792" y="128016"/>
+            <a:ext cx="7845552" cy="553998"/>
+          </a:xfrm>
+          <a:prstGeom prst="rect">
+            <a:avLst/>
+          </a:prstGeom>
+          <a:noFill/>
+        </p:spPr>
+        <p:txBody>
+          <a:bodyPr wrap="square" rtlCol="0">
+            <a:spAutoFit/>
+          </a:bodyPr>
+          <a:lstStyle/>
+          <a:p>
+            <a:r>
+              <a:rPr lang="en-US" sz="3000" b="1" dirty="0">
+                <a:latin typeface="Century Gothic" panose="020B0502020202020204" pitchFamily="34" charset="0"/>
+                <a:cs typeface="Arial" panose="020B0604020202020204" pitchFamily="34" charset="0"/>
+              </a:rPr>
+              <a:t>KEY METRICS</a:t>
+            </a:r>
+          </a:p>
+        </p:txBody>
+      </p:sp>
+      <p:sp>
+        <p:nvSpPr>
+          <p:cNvPr id="3" name="TextBox 2">
+            <a:extLst>
+              <a:ext uri="{FF2B5EF4-FFF2-40B4-BE49-F238E27FC236}">
+                <a16:creationId xmlns:a16="http://schemas.microsoft.com/office/drawing/2014/main" id="{62C93036-784B-72F1-D444-81159F9CB131}"/>
+              </a:ext>
+            </a:extLst>
+          </p:cNvPr>
+          <p:cNvSpPr txBox="1"/>
+          <p:nvPr/>
+        </p:nvSpPr>
+        <p:spPr>
+          <a:xfrm>
+            <a:off x="621792" y="691158"/>
+            <a:ext cx="10963656" cy="3785652"/>
+          </a:xfrm>
+          <a:prstGeom prst="rect">
+            <a:avLst/>
+          </a:prstGeom>
+          <a:noFill/>
+        </p:spPr>
+        <p:txBody>
+          <a:bodyPr wrap="square" rtlCol="0">
+            <a:spAutoFit/>
+          </a:bodyPr>
+          <a:lstStyle/>
+          <a:p>
+            <a:r>
+              <a:rPr lang="en-US" sz="1500" dirty="0">
+                <a:latin typeface="+mj-lt"/>
+              </a:rPr>
+              <a:t>Market Cap</a:t>
+            </a:r>
+          </a:p>
+          <a:p>
+            <a:r>
+              <a:rPr lang="en-US" sz="1500" dirty="0">
+                <a:latin typeface="+mj-lt"/>
+              </a:rPr>
+              <a:t>Price / Earnings</a:t>
+            </a:r>
+          </a:p>
+          <a:p>
+            <a:r>
+              <a:rPr lang="en-US" sz="1500" dirty="0">
+                <a:latin typeface="+mj-lt"/>
+              </a:rPr>
+              <a:t>Price / </a:t>
+            </a:r>
+            <a:r>
+              <a:rPr lang="en-US" sz="1500" dirty="0" err="1">
+                <a:latin typeface="+mj-lt"/>
+              </a:rPr>
+              <a:t>CashFlow</a:t>
+            </a:r>
+            <a:endParaRPr lang="en-US" sz="1500" dirty="0">
+              <a:latin typeface="+mj-lt"/>
+            </a:endParaRPr>
+          </a:p>
+          <a:p>
+            <a:endParaRPr lang="en-US" sz="1500" dirty="0">
+              <a:latin typeface="+mj-lt"/>
+            </a:endParaRPr>
+          </a:p>
+          <a:p>
+            <a:r>
+              <a:rPr lang="en-US" sz="1500" dirty="0">
+                <a:latin typeface="+mj-lt"/>
+              </a:rPr>
+              <a:t>PROFITABILITY</a:t>
+            </a:r>
+          </a:p>
+          <a:p>
+            <a:r>
+              <a:rPr lang="en-US" sz="1500" dirty="0">
+                <a:latin typeface="+mj-lt"/>
+              </a:rPr>
+              <a:t>Operating Margins = Operating Income / Total Revenue		(Operating Margins includes taxes and </a:t>
+            </a:r>
+            <a:r>
+              <a:rPr lang="en-US" sz="1500" dirty="0" err="1">
+                <a:latin typeface="+mj-lt"/>
+              </a:rPr>
+              <a:t>misc</a:t>
+            </a:r>
+            <a:r>
+              <a:rPr lang="en-US" sz="1500" dirty="0">
+                <a:latin typeface="+mj-lt"/>
+              </a:rPr>
+              <a:t> expenses)</a:t>
+            </a:r>
+          </a:p>
+          <a:p>
+            <a:r>
+              <a:rPr lang="en-US" sz="1500" dirty="0">
+                <a:latin typeface="+mj-lt"/>
+              </a:rPr>
+              <a:t>Gross Margins = Total Revenue / Cost of Revenue		(Cost of Revenue includes labor and direct materials only)</a:t>
+            </a:r>
+          </a:p>
+          <a:p>
+            <a:endParaRPr lang="en-US" sz="1500" dirty="0">
+              <a:latin typeface="+mj-lt"/>
+            </a:endParaRPr>
+          </a:p>
+          <a:p>
+            <a:r>
+              <a:rPr lang="en-US" sz="1500" dirty="0">
+                <a:latin typeface="+mj-lt"/>
+              </a:rPr>
+              <a:t>LIQUIDITY</a:t>
+            </a:r>
+          </a:p>
+          <a:p>
+            <a:r>
+              <a:rPr lang="en-US" sz="1500" dirty="0">
+                <a:latin typeface="+mj-lt"/>
+              </a:rPr>
+              <a:t>Working Capital Ratio = Current Assets / Current Liability		(&lt; 1 = Low liquidity, &gt;2 = Too much cash)</a:t>
+            </a:r>
+          </a:p>
+          <a:p>
+            <a:r>
+              <a:rPr lang="en-US" sz="1500" dirty="0">
+                <a:latin typeface="+mj-lt"/>
+              </a:rPr>
+              <a:t>Debt to Equity Ratio = Total Liabilities / Total Shareholder’s Equity</a:t>
+            </a:r>
+          </a:p>
+          <a:p>
+            <a:r>
+              <a:rPr lang="en-US" sz="1500" dirty="0">
+                <a:latin typeface="+mj-lt"/>
+              </a:rPr>
+              <a:t>Return on Equity = Net Income / Shareholder’s Equity</a:t>
+            </a:r>
+          </a:p>
+          <a:p>
+            <a:r>
+              <a:rPr lang="en-US" sz="1500" dirty="0">
+                <a:latin typeface="+mj-lt"/>
+              </a:rPr>
+              <a:t>Retention Ratio = Retained Earnings / Net Income		(Higher for growth companies)</a:t>
+            </a:r>
+          </a:p>
+          <a:p>
+            <a:r>
+              <a:rPr lang="en-US" sz="1500" dirty="0">
+                <a:latin typeface="+mj-lt"/>
+              </a:rPr>
+              <a:t>Operating Cash Flow Ratio = Operating Cash Flow / Total Liabilities</a:t>
+            </a:r>
+          </a:p>
+          <a:p>
+            <a:r>
+              <a:rPr lang="en-US" sz="1500" dirty="0">
+                <a:latin typeface="+mj-lt"/>
+              </a:rPr>
+              <a:t>Cash Flow to Net Income = Operating Cash Flow / Net Income</a:t>
+            </a:r>
+          </a:p>
+          <a:p>
+            <a:r>
+              <a:rPr lang="en-US" sz="1500" dirty="0">
+                <a:latin typeface="+mj-lt"/>
+              </a:rPr>
+              <a:t>Quick Ratio = (Current Assets – Inventory – Accounts Receivables) / Current Liabilities</a:t>
+            </a:r>
+          </a:p>
+        </p:txBody>
+      </p:sp>
+      <p:sp>
+        <p:nvSpPr>
+          <p:cNvPr id="4" name="TextBox 3">
+            <a:extLst>
+              <a:ext uri="{FF2B5EF4-FFF2-40B4-BE49-F238E27FC236}">
+                <a16:creationId xmlns:a16="http://schemas.microsoft.com/office/drawing/2014/main" id="{A7E8E44E-5D6B-5B29-6D32-503710670739}"/>
+              </a:ext>
+            </a:extLst>
+          </p:cNvPr>
+          <p:cNvSpPr txBox="1"/>
+          <p:nvPr/>
+        </p:nvSpPr>
+        <p:spPr>
+          <a:xfrm>
+            <a:off x="621792" y="5843677"/>
+            <a:ext cx="10067544" cy="323165"/>
+          </a:xfrm>
+          <a:prstGeom prst="rect">
+            <a:avLst/>
+          </a:prstGeom>
+          <a:noFill/>
+        </p:spPr>
+        <p:txBody>
+          <a:bodyPr wrap="square" rtlCol="0">
+            <a:spAutoFit/>
+          </a:bodyPr>
+          <a:lstStyle/>
+          <a:p>
+            <a:r>
+              <a:rPr lang="en-US" sz="1500" dirty="0">
+                <a:latin typeface="+mj-lt"/>
+              </a:rPr>
+              <a:t>EBIT = Operating Income</a:t>
+            </a:r>
+          </a:p>
+        </p:txBody>
+      </p:sp>
+    </p:spTree>
+    <p:extLst>
+      <p:ext uri="{BB962C8B-B14F-4D97-AF65-F5344CB8AC3E}">
+        <p14:creationId xmlns:p14="http://schemas.microsoft.com/office/powerpoint/2010/main" val="1646535413"/>
+      </p:ext>
+    </p:extLst>
+  </p:cSld>
+  <p:clrMapOvr>
+    <a:masterClrMapping/>
+  </p:clrMapOvr>
+</p:sld>
+</file>
+
+<file path=ppt/slides/slide3.xml><?xml version="1.0" encoding="utf-8"?>
+<p:sld xmlns:a="http://schemas.openxmlformats.org/drawingml/2006/main" xmlns:r="http://schemas.openxmlformats.org/officeDocument/2006/relationships" xmlns:p="http://schemas.openxmlformats.org/presentationml/2006/main">
+  <p:cSld>
+    <p:spTree>
+      <p:nvGrpSpPr>
+        <p:cNvPr id="1" name=""/>
+        <p:cNvGrpSpPr/>
+        <p:nvPr/>
+      </p:nvGrpSpPr>
+      <p:grpSpPr>
+        <a:xfrm>
+          <a:off x="0" y="0"/>
+          <a:ext cx="0" cy="0"/>
+          <a:chOff x="0" y="0"/>
+          <a:chExt cx="0" cy="0"/>
+        </a:xfrm>
+      </p:grpSpPr>
+      <p:graphicFrame>
+        <p:nvGraphicFramePr>
+          <p:cNvPr id="2" name="Table 1">
+            <a:extLst>
+              <a:ext uri="{FF2B5EF4-FFF2-40B4-BE49-F238E27FC236}">
+                <a16:creationId xmlns:a16="http://schemas.microsoft.com/office/drawing/2014/main" id="{0A888421-186B-859E-B5DD-680F45F51B27}"/>
+              </a:ext>
+            </a:extLst>
+          </p:cNvPr>
+          <p:cNvGraphicFramePr>
+            <a:graphicFrameLocks noGrp="1"/>
+          </p:cNvGraphicFramePr>
+          <p:nvPr>
+            <p:extLst>
+              <p:ext uri="{D42A27DB-BD31-4B8C-83A1-F6EECF244321}">
+                <p14:modId xmlns:p14="http://schemas.microsoft.com/office/powerpoint/2010/main" val="1899197348"/>
+              </p:ext>
+            </p:extLst>
+          </p:nvPr>
+        </p:nvGraphicFramePr>
+        <p:xfrm>
+          <a:off x="614680" y="692234"/>
+          <a:ext cx="10961625" cy="1854200"/>
+        </p:xfrm>
+        <a:graphic>
+          <a:graphicData uri="http://schemas.openxmlformats.org/drawingml/2006/table">
+            <a:tbl>
+              <a:tblPr firstRow="1" bandRow="1">
+                <a:tableStyleId>{5C22544A-7EE6-4342-B048-85BDC9FD1C3A}</a:tableStyleId>
+              </a:tblPr>
+              <a:tblGrid>
+                <a:gridCol w="2192325">
+                  <a:extLst>
+                    <a:ext uri="{9D8B030D-6E8A-4147-A177-3AD203B41FA5}">
+                      <a16:colId xmlns:a16="http://schemas.microsoft.com/office/drawing/2014/main" val="1037246329"/>
+                    </a:ext>
+                  </a:extLst>
+                </a:gridCol>
+                <a:gridCol w="2192325">
+                  <a:extLst>
+                    <a:ext uri="{9D8B030D-6E8A-4147-A177-3AD203B41FA5}">
+                      <a16:colId xmlns:a16="http://schemas.microsoft.com/office/drawing/2014/main" val="2104657393"/>
+                    </a:ext>
+                  </a:extLst>
+                </a:gridCol>
+                <a:gridCol w="2192325">
+                  <a:extLst>
+                    <a:ext uri="{9D8B030D-6E8A-4147-A177-3AD203B41FA5}">
+                      <a16:colId xmlns:a16="http://schemas.microsoft.com/office/drawing/2014/main" val="2059516645"/>
+                    </a:ext>
+                  </a:extLst>
+                </a:gridCol>
+                <a:gridCol w="2192325">
+                  <a:extLst>
+                    <a:ext uri="{9D8B030D-6E8A-4147-A177-3AD203B41FA5}">
+                      <a16:colId xmlns:a16="http://schemas.microsoft.com/office/drawing/2014/main" val="2095543615"/>
+                    </a:ext>
+                  </a:extLst>
+                </a:gridCol>
+                <a:gridCol w="2192325">
+                  <a:extLst>
+                    <a:ext uri="{9D8B030D-6E8A-4147-A177-3AD203B41FA5}">
+                      <a16:colId xmlns:a16="http://schemas.microsoft.com/office/drawing/2014/main" val="1028728938"/>
+                    </a:ext>
+                  </a:extLst>
+                </a:gridCol>
+              </a:tblGrid>
+              <a:tr h="370840">
+                <a:tc>
+                  <a:txBody>
+                    <a:bodyPr/>
+                    <a:lstStyle/>
+                    <a:p>
+                      <a:endParaRPr lang="en-US"/>
+                    </a:p>
+                  </a:txBody>
+                  <a:tcPr/>
+                </a:tc>
+                <a:tc>
+                  <a:txBody>
+                    <a:bodyPr/>
+                    <a:lstStyle/>
+                    <a:p>
+                      <a:r>
+                        <a:rPr lang="en-US" dirty="0"/>
+                        <a:t>STATUS</a:t>
+                      </a:r>
+                    </a:p>
+                  </a:txBody>
+                  <a:tcPr/>
+                </a:tc>
+                <a:tc>
+                  <a:txBody>
+                    <a:bodyPr/>
+                    <a:lstStyle/>
+                    <a:p>
+                      <a:r>
+                        <a:rPr lang="en-US" dirty="0"/>
+                        <a:t>2021</a:t>
+                      </a:r>
+                    </a:p>
+                  </a:txBody>
+                  <a:tcPr/>
+                </a:tc>
+                <a:tc>
+                  <a:txBody>
+                    <a:bodyPr/>
+                    <a:lstStyle/>
+                    <a:p>
+                      <a:r>
+                        <a:rPr lang="en-US" dirty="0"/>
+                        <a:t>2022</a:t>
+                      </a:r>
+                    </a:p>
+                  </a:txBody>
+                  <a:tcPr/>
+                </a:tc>
+                <a:tc>
+                  <a:txBody>
+                    <a:bodyPr/>
+                    <a:lstStyle/>
+                    <a:p>
+                      <a:r>
+                        <a:rPr lang="en-US" dirty="0"/>
+                        <a:t>2023</a:t>
+                      </a:r>
+                    </a:p>
+                  </a:txBody>
+                  <a:tcPr/>
+                </a:tc>
+                <a:extLst>
+                  <a:ext uri="{0D108BD9-81ED-4DB2-BD59-A6C34878D82A}">
+                    <a16:rowId xmlns:a16="http://schemas.microsoft.com/office/drawing/2014/main" val="3379863026"/>
+                  </a:ext>
+                </a:extLst>
+              </a:tr>
+              <a:tr h="370840">
+                <a:tc>
+                  <a:txBody>
+                    <a:bodyPr/>
+                    <a:lstStyle/>
+                    <a:p>
+                      <a:endParaRPr lang="en-US"/>
+                    </a:p>
+                  </a:txBody>
+                  <a:tcPr/>
+                </a:tc>
+                <a:tc>
+                  <a:txBody>
+                    <a:bodyPr/>
+                    <a:lstStyle/>
+                    <a:p>
+                      <a:endParaRPr lang="en-US"/>
+                    </a:p>
+                  </a:txBody>
+                  <a:tcPr/>
+                </a:tc>
+                <a:tc>
+                  <a:txBody>
+                    <a:bodyPr/>
+                    <a:lstStyle/>
+                    <a:p>
+                      <a:endParaRPr lang="en-US"/>
+                    </a:p>
+                  </a:txBody>
+                  <a:tcPr/>
+                </a:tc>
+                <a:tc>
+                  <a:txBody>
+                    <a:bodyPr/>
+                    <a:lstStyle/>
+                    <a:p>
+                      <a:endParaRPr lang="en-US"/>
+                    </a:p>
+                  </a:txBody>
+                  <a:tcPr/>
+                </a:tc>
+                <a:tc>
+                  <a:txBody>
+                    <a:bodyPr/>
+                    <a:lstStyle/>
+                    <a:p>
+                      <a:endParaRPr lang="en-US"/>
+                    </a:p>
+                  </a:txBody>
+                  <a:tcPr/>
+                </a:tc>
+                <a:extLst>
+                  <a:ext uri="{0D108BD9-81ED-4DB2-BD59-A6C34878D82A}">
+                    <a16:rowId xmlns:a16="http://schemas.microsoft.com/office/drawing/2014/main" val="2947437048"/>
+                  </a:ext>
+                </a:extLst>
+              </a:tr>
+              <a:tr h="370840">
+                <a:tc>
+                  <a:txBody>
+                    <a:bodyPr/>
+                    <a:lstStyle/>
+                    <a:p>
+                      <a:endParaRPr lang="en-US"/>
+                    </a:p>
+                  </a:txBody>
+                  <a:tcPr/>
+                </a:tc>
+                <a:tc>
+                  <a:txBody>
+                    <a:bodyPr/>
+                    <a:lstStyle/>
+                    <a:p>
+                      <a:endParaRPr lang="en-US"/>
+                    </a:p>
+                  </a:txBody>
+                  <a:tcPr/>
+                </a:tc>
+                <a:tc>
+                  <a:txBody>
+                    <a:bodyPr/>
+                    <a:lstStyle/>
+                    <a:p>
+                      <a:endParaRPr lang="en-US"/>
+                    </a:p>
+                  </a:txBody>
+                  <a:tcPr/>
+                </a:tc>
+                <a:tc>
+                  <a:txBody>
+                    <a:bodyPr/>
+                    <a:lstStyle/>
+                    <a:p>
+                      <a:endParaRPr lang="en-US"/>
+                    </a:p>
+                  </a:txBody>
+                  <a:tcPr/>
+                </a:tc>
+                <a:tc>
+                  <a:txBody>
+                    <a:bodyPr/>
+                    <a:lstStyle/>
+                    <a:p>
+                      <a:endParaRPr lang="en-US"/>
+                    </a:p>
+                  </a:txBody>
+                  <a:tcPr/>
+                </a:tc>
+                <a:extLst>
+                  <a:ext uri="{0D108BD9-81ED-4DB2-BD59-A6C34878D82A}">
+                    <a16:rowId xmlns:a16="http://schemas.microsoft.com/office/drawing/2014/main" val="4031858209"/>
+                  </a:ext>
+                </a:extLst>
+              </a:tr>
+              <a:tr h="370840">
+                <a:tc>
+                  <a:txBody>
+                    <a:bodyPr/>
+                    <a:lstStyle/>
+                    <a:p>
+                      <a:endParaRPr lang="en-US"/>
+                    </a:p>
+                  </a:txBody>
+                  <a:tcPr/>
+                </a:tc>
+                <a:tc>
+                  <a:txBody>
+                    <a:bodyPr/>
+                    <a:lstStyle/>
+                    <a:p>
+                      <a:endParaRPr lang="en-US"/>
+                    </a:p>
+                  </a:txBody>
+                  <a:tcPr/>
+                </a:tc>
+                <a:tc>
+                  <a:txBody>
+                    <a:bodyPr/>
+                    <a:lstStyle/>
+                    <a:p>
+                      <a:endParaRPr lang="en-US"/>
+                    </a:p>
+                  </a:txBody>
+                  <a:tcPr/>
+                </a:tc>
+                <a:tc>
+                  <a:txBody>
+                    <a:bodyPr/>
+                    <a:lstStyle/>
+                    <a:p>
+                      <a:endParaRPr lang="en-US"/>
+                    </a:p>
+                  </a:txBody>
+                  <a:tcPr/>
+                </a:tc>
+                <a:tc>
+                  <a:txBody>
+                    <a:bodyPr/>
+                    <a:lstStyle/>
+                    <a:p>
+                      <a:endParaRPr lang="en-US"/>
+                    </a:p>
+                  </a:txBody>
+                  <a:tcPr/>
+                </a:tc>
+                <a:extLst>
+                  <a:ext uri="{0D108BD9-81ED-4DB2-BD59-A6C34878D82A}">
+                    <a16:rowId xmlns:a16="http://schemas.microsoft.com/office/drawing/2014/main" val="4074205082"/>
+                  </a:ext>
+                </a:extLst>
+              </a:tr>
+              <a:tr h="370840">
+                <a:tc>
+                  <a:txBody>
+                    <a:bodyPr/>
+                    <a:lstStyle/>
+                    <a:p>
+                      <a:endParaRPr lang="en-US"/>
+                    </a:p>
+                  </a:txBody>
+                  <a:tcPr/>
+                </a:tc>
+                <a:tc>
+                  <a:txBody>
+                    <a:bodyPr/>
+                    <a:lstStyle/>
+                    <a:p>
+                      <a:endParaRPr lang="en-US"/>
+                    </a:p>
+                  </a:txBody>
+                  <a:tcPr/>
+                </a:tc>
+                <a:tc>
+                  <a:txBody>
+                    <a:bodyPr/>
+                    <a:lstStyle/>
+                    <a:p>
+                      <a:endParaRPr lang="en-US"/>
+                    </a:p>
+                  </a:txBody>
+                  <a:tcPr/>
+                </a:tc>
+                <a:tc>
+                  <a:txBody>
+                    <a:bodyPr/>
+                    <a:lstStyle/>
+                    <a:p>
+                      <a:endParaRPr lang="en-US"/>
+                    </a:p>
+                  </a:txBody>
+                  <a:tcPr/>
+                </a:tc>
+                <a:tc>
+                  <a:txBody>
+                    <a:bodyPr/>
+                    <a:lstStyle/>
+                    <a:p>
+                      <a:endParaRPr lang="en-US" dirty="0"/>
+                    </a:p>
+                  </a:txBody>
+                  <a:tcPr/>
+                </a:tc>
+                <a:extLst>
+                  <a:ext uri="{0D108BD9-81ED-4DB2-BD59-A6C34878D82A}">
+                    <a16:rowId xmlns:a16="http://schemas.microsoft.com/office/drawing/2014/main" val="2849525622"/>
+                  </a:ext>
+                </a:extLst>
+              </a:tr>
+            </a:tbl>
+          </a:graphicData>
+        </a:graphic>
+      </p:graphicFrame>
+    </p:spTree>
+    <p:extLst>
+      <p:ext uri="{BB962C8B-B14F-4D97-AF65-F5344CB8AC3E}">
+        <p14:creationId xmlns:p14="http://schemas.microsoft.com/office/powerpoint/2010/main" val="348797900"/>
+      </p:ext>
+    </p:extLst>
+  </p:cSld>
+  <p:clrMapOvr>
+    <a:masterClrMapping/>
+  </p:clrMapOvr>
+</p:sld>
+</file>
+
 <file path=ppt/theme/theme1.xml><?xml version="1.0" encoding="utf-8"?>
 <a:theme xmlns:a="http://schemas.openxmlformats.org/drawingml/2006/main" name="Office Theme">
   <a:themeElements>

</xml_diff>